<commit_message>
docs: atualizar arquivo pdf
</commit_message>
<xml_diff>
--- a/Trilhas/[Business Agility T5 - ONE]/01..Agilidade-promovendo_a_transformacao_agil.pptx
+++ b/Trilhas/[Business Agility T5 - ONE]/01..Agilidade-promovendo_a_transformacao_agil.pptx
@@ -5,10 +5,10 @@
     <p:sldMasterId id="2147483660" r:id="rId1"/>
   </p:sldMasterIdLst>
   <p:notesMasterIdLst>
-    <p:notesMasterId r:id="rId16"/>
+    <p:notesMasterId r:id="rId21"/>
   </p:notesMasterIdLst>
   <p:handoutMasterIdLst>
-    <p:handoutMasterId r:id="rId17"/>
+    <p:handoutMasterId r:id="rId22"/>
   </p:handoutMasterIdLst>
   <p:sldIdLst>
     <p:sldId id="256" r:id="rId2"/>
@@ -24,7 +24,12 @@
     <p:sldId id="315" r:id="rId12"/>
     <p:sldId id="316" r:id="rId13"/>
     <p:sldId id="318" r:id="rId14"/>
-    <p:sldId id="308" r:id="rId15"/>
+    <p:sldId id="321" r:id="rId15"/>
+    <p:sldId id="322" r:id="rId16"/>
+    <p:sldId id="308" r:id="rId17"/>
+    <p:sldId id="324" r:id="rId18"/>
+    <p:sldId id="325" r:id="rId19"/>
+    <p:sldId id="327" r:id="rId20"/>
   </p:sldIdLst>
   <p:sldSz cx="12192000" cy="6858000"/>
   <p:notesSz cx="6858000" cy="9144000"/>
@@ -141,7 +146,12 @@
             <p14:sldId id="315"/>
             <p14:sldId id="316"/>
             <p14:sldId id="318"/>
+            <p14:sldId id="321"/>
+            <p14:sldId id="322"/>
             <p14:sldId id="308"/>
+            <p14:sldId id="324"/>
+            <p14:sldId id="325"/>
+            <p14:sldId id="327"/>
           </p14:sldIdLst>
         </p14:section>
       </p14:sectionLst>
@@ -13582,7 +13592,7 @@
             <a:pPr rtl="0"/>
             <a:fld id="{12E8EFE0-5F29-4A8F-882F-2C5E3702D946}" type="datetime1">
               <a:rPr lang="pt-BR" smtClean="0"/>
-              <a:t>02/06/2023</a:t>
+              <a:t>04/06/2023</a:t>
             </a:fld>
             <a:endParaRPr lang="pt-BR"/>
           </a:p>
@@ -13752,7 +13762,7 @@
             <a:fld id="{25C915AE-A572-46FB-8F05-B028884B90C4}" type="datetime1">
               <a:rPr lang="pt-BR" smtClean="0"/>
               <a:pPr/>
-              <a:t>02/06/2023</a:t>
+              <a:t>04/06/2023</a:t>
             </a:fld>
             <a:endParaRPr lang="pt-BR" dirty="0"/>
           </a:p>
@@ -14296,6 +14306,97 @@
 </p:notes>
 </file>
 
+<file path=ppt/notesSlides/notesSlide4.xml><?xml version="1.0" encoding="utf-8"?>
+<p:notes xmlns:a="http://schemas.openxmlformats.org/drawingml/2006/main" xmlns:r="http://schemas.openxmlformats.org/officeDocument/2006/relationships" xmlns:p="http://schemas.openxmlformats.org/presentationml/2006/main">
+  <p:cSld>
+    <p:spTree>
+      <p:nvGrpSpPr>
+        <p:cNvPr id="1" name=""/>
+        <p:cNvGrpSpPr/>
+        <p:nvPr/>
+      </p:nvGrpSpPr>
+      <p:grpSpPr>
+        <a:xfrm>
+          <a:off x="0" y="0"/>
+          <a:ext cx="0" cy="0"/>
+          <a:chOff x="0" y="0"/>
+          <a:chExt cx="0" cy="0"/>
+        </a:xfrm>
+      </p:grpSpPr>
+      <p:sp>
+        <p:nvSpPr>
+          <p:cNvPr id="2" name="Espaço Reservado para Imagem do Slide 1"/>
+          <p:cNvSpPr>
+            <a:spLocks noGrp="1" noRot="1" noChangeAspect="1"/>
+          </p:cNvSpPr>
+          <p:nvPr>
+            <p:ph type="sldImg"/>
+          </p:nvPr>
+        </p:nvSpPr>
+        <p:spPr>
+          <a:xfrm>
+            <a:off x="685800" y="1143000"/>
+            <a:ext cx="5486400" cy="3086100"/>
+          </a:xfrm>
+        </p:spPr>
+      </p:sp>
+      <p:sp>
+        <p:nvSpPr>
+          <p:cNvPr id="3" name="Espaço Reservado para Notas 2"/>
+          <p:cNvSpPr>
+            <a:spLocks noGrp="1"/>
+          </p:cNvSpPr>
+          <p:nvPr>
+            <p:ph type="body" idx="1"/>
+          </p:nvPr>
+        </p:nvSpPr>
+        <p:spPr/>
+        <p:txBody>
+          <a:bodyPr rtlCol="0"/>
+          <a:lstStyle/>
+          <a:p>
+            <a:pPr rtl="0"/>
+            <a:endParaRPr lang="pt-BR"/>
+          </a:p>
+        </p:txBody>
+      </p:sp>
+      <p:sp>
+        <p:nvSpPr>
+          <p:cNvPr id="4" name="Espaço Reservado para o Número do Slide 3"/>
+          <p:cNvSpPr>
+            <a:spLocks noGrp="1"/>
+          </p:cNvSpPr>
+          <p:nvPr>
+            <p:ph type="sldNum" sz="quarter" idx="10"/>
+          </p:nvPr>
+        </p:nvSpPr>
+        <p:spPr/>
+        <p:txBody>
+          <a:bodyPr rtlCol="0"/>
+          <a:lstStyle/>
+          <a:p>
+            <a:pPr rtl="0"/>
+            <a:fld id="{DF61EA0F-A667-4B49-8422-0062BC55E249}" type="slidenum">
+              <a:rPr lang="pt-BR" smtClean="0"/>
+              <a:t>17</a:t>
+            </a:fld>
+            <a:endParaRPr lang="pt-BR"/>
+          </a:p>
+        </p:txBody>
+      </p:sp>
+    </p:spTree>
+    <p:extLst>
+      <p:ext uri="{BB962C8B-B14F-4D97-AF65-F5344CB8AC3E}">
+        <p14:creationId xmlns:p14="http://schemas.microsoft.com/office/powerpoint/2010/main" val="2598792815"/>
+      </p:ext>
+    </p:extLst>
+  </p:cSld>
+  <p:clrMapOvr>
+    <a:masterClrMapping/>
+  </p:clrMapOvr>
+</p:notes>
+</file>
+
 <file path=ppt/slideLayouts/slideLayout1.xml><?xml version="1.0" encoding="utf-8"?>
 <p:sldLayout xmlns:a="http://schemas.openxmlformats.org/drawingml/2006/main" xmlns:r="http://schemas.openxmlformats.org/officeDocument/2006/relationships" xmlns:p="http://schemas.openxmlformats.org/presentationml/2006/main" preserve="1" userDrawn="1">
   <p:cSld name="Slide de Título">
@@ -14734,7 +14835,7 @@
             <a:pPr rtl="0"/>
             <a:fld id="{DFFABA16-A60E-4C58-9DC9-284576B05B35}" type="datetime1">
               <a:rPr lang="pt-BR" noProof="0" smtClean="0"/>
-              <a:t>02/06/2023</a:t>
+              <a:t>04/06/2023</a:t>
             </a:fld>
             <a:endParaRPr lang="pt-BR" noProof="0"/>
           </a:p>
@@ -15360,7 +15461,7 @@
             <a:pPr rtl="0"/>
             <a:fld id="{495CCA5C-24EB-4738-B463-0ADFEF5D3564}" type="datetime1">
               <a:rPr lang="pt-BR" noProof="0" smtClean="0"/>
-              <a:t>02/06/2023</a:t>
+              <a:t>04/06/2023</a:t>
             </a:fld>
             <a:endParaRPr lang="pt-BR" noProof="0" dirty="0"/>
           </a:p>
@@ -17048,6 +17149,289 @@
           <p:cNvPr id="2" name="Título 1">
             <a:extLst>
               <a:ext uri="{FF2B5EF4-FFF2-40B4-BE49-F238E27FC236}">
+                <a16:creationId xmlns:a16="http://schemas.microsoft.com/office/drawing/2014/main" id="{D452B5E9-260D-10D2-201B-B80B20BB30FA}"/>
+              </a:ext>
+            </a:extLst>
+          </p:cNvPr>
+          <p:cNvSpPr>
+            <a:spLocks noGrp="1"/>
+          </p:cNvSpPr>
+          <p:nvPr>
+            <p:ph type="title"/>
+          </p:nvPr>
+        </p:nvSpPr>
+        <p:spPr/>
+        <p:txBody>
+          <a:bodyPr/>
+          <a:lstStyle/>
+          <a:p>
+            <a:r>
+              <a:rPr lang="pt-BR" dirty="0"/>
+              <a:t>Agilidade para além do TI </a:t>
+            </a:r>
+          </a:p>
+        </p:txBody>
+      </p:sp>
+      <p:sp>
+        <p:nvSpPr>
+          <p:cNvPr id="3" name="Espaço Reservado para Conteúdo 2">
+            <a:extLst>
+              <a:ext uri="{FF2B5EF4-FFF2-40B4-BE49-F238E27FC236}">
+                <a16:creationId xmlns:a16="http://schemas.microsoft.com/office/drawing/2014/main" id="{226CE4AA-F6BA-6B25-2AB6-2F77117AB133}"/>
+              </a:ext>
+            </a:extLst>
+          </p:cNvPr>
+          <p:cNvSpPr>
+            <a:spLocks noGrp="1"/>
+          </p:cNvSpPr>
+          <p:nvPr>
+            <p:ph sz="quarter" idx="10"/>
+          </p:nvPr>
+        </p:nvSpPr>
+        <p:spPr/>
+        <p:txBody>
+          <a:bodyPr/>
+          <a:lstStyle/>
+          <a:p>
+            <a:r>
+              <a:rPr lang="pt-BR" b="1" dirty="0"/>
+              <a:t>ETAPAS DA CERIMÔNIA</a:t>
+            </a:r>
+            <a:br>
+              <a:rPr lang="pt-BR" b="1" dirty="0"/>
+            </a:br>
+            <a:endParaRPr lang="pt-BR" b="1" dirty="0"/>
+          </a:p>
+          <a:p>
+            <a:pPr marL="171450" indent="-171450">
+              <a:buFont typeface="Courier New" panose="02070309020205020404" pitchFamily="49" charset="0"/>
+              <a:buChar char="o"/>
+            </a:pPr>
+            <a:r>
+              <a:rPr lang="pt-BR" b="1" i="1" dirty="0"/>
+              <a:t>Retrospectiva: </a:t>
+            </a:r>
+            <a:r>
+              <a:rPr lang="pt-BR" dirty="0"/>
+              <a:t>Análise de melhorias necessárias – equipe, comunicação, processos, ferramentas... </a:t>
+            </a:r>
+          </a:p>
+          <a:p>
+            <a:pPr marL="171450" indent="-171450">
+              <a:buFont typeface="Courier New" panose="02070309020205020404" pitchFamily="49" charset="0"/>
+              <a:buChar char="o"/>
+            </a:pPr>
+            <a:r>
+              <a:rPr lang="pt-BR" b="1" i="1" dirty="0"/>
+              <a:t>Planejamento: </a:t>
+            </a:r>
+            <a:r>
+              <a:rPr lang="pt-BR" dirty="0"/>
+              <a:t>Demandas prioritárias são divididas entre o time. </a:t>
+            </a:r>
+          </a:p>
+          <a:p>
+            <a:pPr marL="171450" indent="-171450">
+              <a:buFont typeface="Courier New" panose="02070309020205020404" pitchFamily="49" charset="0"/>
+              <a:buChar char="o"/>
+            </a:pPr>
+            <a:r>
+              <a:rPr lang="pt-BR" b="1" i="1" dirty="0"/>
+              <a:t>Sprint: </a:t>
+            </a:r>
+            <a:r>
+              <a:rPr lang="pt-BR" dirty="0"/>
+              <a:t>Período para trabalhar as demandas estabelecidas (desenvolvedores); </a:t>
+            </a:r>
+          </a:p>
+          <a:p>
+            <a:pPr marL="171450" indent="-171450">
+              <a:buFont typeface="Courier New" panose="02070309020205020404" pitchFamily="49" charset="0"/>
+              <a:buChar char="o"/>
+            </a:pPr>
+            <a:r>
+              <a:rPr lang="pt-BR" b="1" i="1" dirty="0"/>
+              <a:t>Review: </a:t>
+            </a:r>
+            <a:r>
+              <a:rPr lang="pt-BR" dirty="0"/>
+              <a:t>Apresentação das entregas de valores realizadas. </a:t>
+            </a:r>
+          </a:p>
+          <a:p>
+            <a:pPr marL="171450" indent="-171450">
+              <a:buFontTx/>
+              <a:buChar char="-"/>
+            </a:pPr>
+            <a:endParaRPr lang="pt-BR" dirty="0"/>
+          </a:p>
+          <a:p>
+            <a:endParaRPr lang="pt-BR" dirty="0"/>
+          </a:p>
+        </p:txBody>
+      </p:sp>
+    </p:spTree>
+    <p:extLst>
+      <p:ext uri="{BB962C8B-B14F-4D97-AF65-F5344CB8AC3E}">
+        <p14:creationId xmlns:p14="http://schemas.microsoft.com/office/powerpoint/2010/main" val="527460099"/>
+      </p:ext>
+    </p:extLst>
+  </p:cSld>
+  <p:clrMapOvr>
+    <a:masterClrMapping/>
+  </p:clrMapOvr>
+</p:sld>
+</file>
+
+<file path=ppt/slides/slide15.xml><?xml version="1.0" encoding="utf-8"?>
+<p:sld xmlns:a="http://schemas.openxmlformats.org/drawingml/2006/main" xmlns:r="http://schemas.openxmlformats.org/officeDocument/2006/relationships" xmlns:p="http://schemas.openxmlformats.org/presentationml/2006/main">
+  <p:cSld>
+    <p:spTree>
+      <p:nvGrpSpPr>
+        <p:cNvPr id="1" name=""/>
+        <p:cNvGrpSpPr/>
+        <p:nvPr/>
+      </p:nvGrpSpPr>
+      <p:grpSpPr>
+        <a:xfrm>
+          <a:off x="0" y="0"/>
+          <a:ext cx="0" cy="0"/>
+          <a:chOff x="0" y="0"/>
+          <a:chExt cx="0" cy="0"/>
+        </a:xfrm>
+      </p:grpSpPr>
+      <p:sp>
+        <p:nvSpPr>
+          <p:cNvPr id="2" name="Título 1">
+            <a:extLst>
+              <a:ext uri="{FF2B5EF4-FFF2-40B4-BE49-F238E27FC236}">
+                <a16:creationId xmlns:a16="http://schemas.microsoft.com/office/drawing/2014/main" id="{0CB7D33E-8DDF-F27B-E913-B3639A5B4CB0}"/>
+              </a:ext>
+            </a:extLst>
+          </p:cNvPr>
+          <p:cNvSpPr>
+            <a:spLocks noGrp="1"/>
+          </p:cNvSpPr>
+          <p:nvPr>
+            <p:ph type="title"/>
+          </p:nvPr>
+        </p:nvSpPr>
+        <p:spPr/>
+        <p:txBody>
+          <a:bodyPr/>
+          <a:lstStyle/>
+          <a:p>
+            <a:r>
+              <a:rPr lang="pt-BR" dirty="0"/>
+              <a:t>Agilidade para além do TI </a:t>
+            </a:r>
+          </a:p>
+        </p:txBody>
+      </p:sp>
+      <p:sp>
+        <p:nvSpPr>
+          <p:cNvPr id="3" name="Espaço Reservado para Conteúdo 2">
+            <a:extLst>
+              <a:ext uri="{FF2B5EF4-FFF2-40B4-BE49-F238E27FC236}">
+                <a16:creationId xmlns:a16="http://schemas.microsoft.com/office/drawing/2014/main" id="{E3C30E1B-8CC2-15D9-4495-C7F38C41B3D4}"/>
+              </a:ext>
+            </a:extLst>
+          </p:cNvPr>
+          <p:cNvSpPr>
+            <a:spLocks noGrp="1"/>
+          </p:cNvSpPr>
+          <p:nvPr>
+            <p:ph sz="quarter" idx="10"/>
+          </p:nvPr>
+        </p:nvSpPr>
+        <p:spPr/>
+        <p:txBody>
+          <a:bodyPr/>
+          <a:lstStyle/>
+          <a:p>
+            <a:r>
+              <a:rPr lang="pt-BR" b="1" i="1" dirty="0"/>
+              <a:t>01. Problemas de contexto </a:t>
+            </a:r>
+            <a:br>
+              <a:rPr lang="pt-BR" b="1" i="1" dirty="0"/>
+            </a:br>
+            <a:r>
+              <a:rPr lang="pt-BR" dirty="0"/>
+              <a:t>Analisar o contexto e reconhecer os problemas </a:t>
+            </a:r>
+            <a:br>
+              <a:rPr lang="pt-BR" dirty="0"/>
+            </a:br>
+            <a:br>
+              <a:rPr lang="pt-BR" dirty="0"/>
+            </a:br>
+            <a:r>
+              <a:rPr lang="pt-BR" b="1" i="1" dirty="0"/>
+              <a:t>02. Tomada de decisão </a:t>
+            </a:r>
+            <a:br>
+              <a:rPr lang="pt-BR" b="1" i="1" dirty="0"/>
+            </a:br>
+            <a:r>
+              <a:rPr lang="pt-BR" dirty="0"/>
+              <a:t>Identificar a frequência da tomada de decisão </a:t>
+            </a:r>
+            <a:br>
+              <a:rPr lang="pt-BR" dirty="0"/>
+            </a:br>
+            <a:br>
+              <a:rPr lang="pt-BR" dirty="0"/>
+            </a:br>
+            <a:r>
+              <a:rPr lang="pt-BR" b="1" i="1" dirty="0"/>
+              <a:t>03. Estrutura e silos </a:t>
+            </a:r>
+            <a:br>
+              <a:rPr lang="pt-BR" b="1" i="1" dirty="0"/>
+            </a:br>
+            <a:r>
+              <a:rPr lang="pt-BR" dirty="0"/>
+              <a:t>Estudar frameworks e pensar em soluções para os problemas. </a:t>
+            </a:r>
+          </a:p>
+        </p:txBody>
+      </p:sp>
+    </p:spTree>
+    <p:extLst>
+      <p:ext uri="{BB962C8B-B14F-4D97-AF65-F5344CB8AC3E}">
+        <p14:creationId xmlns:p14="http://schemas.microsoft.com/office/powerpoint/2010/main" val="2883483953"/>
+      </p:ext>
+    </p:extLst>
+  </p:cSld>
+  <p:clrMapOvr>
+    <a:masterClrMapping/>
+  </p:clrMapOvr>
+</p:sld>
+</file>
+
+<file path=ppt/slides/slide16.xml><?xml version="1.0" encoding="utf-8"?>
+<p:sld xmlns:a="http://schemas.openxmlformats.org/drawingml/2006/main" xmlns:r="http://schemas.openxmlformats.org/officeDocument/2006/relationships" xmlns:p="http://schemas.openxmlformats.org/presentationml/2006/main">
+  <p:cSld>
+    <p:spTree>
+      <p:nvGrpSpPr>
+        <p:cNvPr id="1" name=""/>
+        <p:cNvGrpSpPr/>
+        <p:nvPr/>
+      </p:nvGrpSpPr>
+      <p:grpSpPr>
+        <a:xfrm>
+          <a:off x="0" y="0"/>
+          <a:ext cx="0" cy="0"/>
+          <a:chOff x="0" y="0"/>
+          <a:chExt cx="0" cy="0"/>
+        </a:xfrm>
+      </p:grpSpPr>
+      <p:sp>
+        <p:nvSpPr>
+          <p:cNvPr id="2" name="Título 1">
+            <a:extLst>
+              <a:ext uri="{FF2B5EF4-FFF2-40B4-BE49-F238E27FC236}">
                 <a16:creationId xmlns:a16="http://schemas.microsoft.com/office/drawing/2014/main" id="{AF4B0C40-3058-0F90-8E45-9F1D5E6CA47E}"/>
               </a:ext>
             </a:extLst>
@@ -17064,7 +17448,10 @@
           <a:bodyPr/>
           <a:lstStyle/>
           <a:p>
-            <a:endParaRPr lang="pt-BR" dirty="0"/>
+            <a:r>
+              <a:rPr lang="pt-BR" dirty="0"/>
+              <a:t>O que aprendemos? </a:t>
+            </a:r>
           </a:p>
         </p:txBody>
       </p:sp>
@@ -17084,12 +17471,232 @@
             <p:ph sz="quarter" idx="13"/>
           </p:nvPr>
         </p:nvSpPr>
-        <p:spPr/>
+        <p:spPr>
+          <a:xfrm>
+            <a:off x="278296" y="2412757"/>
+            <a:ext cx="11396870" cy="4537943"/>
+          </a:xfrm>
+        </p:spPr>
         <p:txBody>
-          <a:bodyPr/>
+          <a:bodyPr>
+            <a:normAutofit fontScale="40000" lnSpcReduction="20000"/>
+          </a:bodyPr>
           <a:lstStyle/>
           <a:p>
-            <a:endParaRPr lang="pt-BR"/>
+            <a:pPr algn="l"/>
+            <a:r>
+              <a:rPr lang="pt-BR" sz="2800" b="1" i="0" dirty="0">
+                <a:solidFill>
+                  <a:srgbClr val="3D464D"/>
+                </a:solidFill>
+                <a:effectLst/>
+                <a:latin typeface="+mn-lt"/>
+              </a:rPr>
+              <a:t>Qual a origem do </a:t>
+            </a:r>
+            <a:r>
+              <a:rPr lang="pt-BR" sz="2800" b="1" i="0" dirty="0" err="1">
+                <a:solidFill>
+                  <a:srgbClr val="3D464D"/>
+                </a:solidFill>
+                <a:effectLst/>
+                <a:latin typeface="+mn-lt"/>
+              </a:rPr>
+              <a:t>Agile</a:t>
+            </a:r>
+            <a:r>
+              <a:rPr lang="pt-BR" sz="2800" b="1" i="0" dirty="0">
+                <a:solidFill>
+                  <a:srgbClr val="3D464D"/>
+                </a:solidFill>
+                <a:effectLst/>
+                <a:latin typeface="+mn-lt"/>
+              </a:rPr>
+              <a:t>?</a:t>
+            </a:r>
+            <a:endParaRPr lang="pt-BR" sz="2800" b="0" i="0" dirty="0">
+              <a:solidFill>
+                <a:srgbClr val="3D464D"/>
+              </a:solidFill>
+              <a:effectLst/>
+              <a:latin typeface="+mn-lt"/>
+            </a:endParaRPr>
+          </a:p>
+          <a:p>
+            <a:pPr algn="l"/>
+            <a:r>
+              <a:rPr lang="pt-BR" sz="2800" b="0" i="0" dirty="0">
+                <a:solidFill>
+                  <a:srgbClr val="3D464D"/>
+                </a:solidFill>
+                <a:effectLst/>
+                <a:latin typeface="+mn-lt"/>
+              </a:rPr>
+              <a:t>A engenharia de Software surgiu depois das outras engenharias já existentes e, por ser uma engenharia, ela herdou o </a:t>
+            </a:r>
+            <a:r>
+              <a:rPr lang="pt-BR" sz="2800" b="0" i="0" dirty="0" err="1">
+                <a:solidFill>
+                  <a:srgbClr val="3D464D"/>
+                </a:solidFill>
+                <a:effectLst/>
+                <a:latin typeface="+mn-lt"/>
+              </a:rPr>
+              <a:t>mindset</a:t>
+            </a:r>
+            <a:r>
+              <a:rPr lang="pt-BR" sz="2800" b="0" i="0" dirty="0">
+                <a:solidFill>
+                  <a:srgbClr val="3D464D"/>
+                </a:solidFill>
+                <a:effectLst/>
+                <a:latin typeface="+mn-lt"/>
+              </a:rPr>
+              <a:t> das que vieram antes.</a:t>
+            </a:r>
+          </a:p>
+          <a:p>
+            <a:pPr algn="l"/>
+            <a:r>
+              <a:rPr lang="pt-BR" sz="2800" b="0" i="0" dirty="0">
+                <a:solidFill>
+                  <a:srgbClr val="3D464D"/>
+                </a:solidFill>
+                <a:effectLst/>
+                <a:latin typeface="+mn-lt"/>
+              </a:rPr>
+              <a:t>O método de desenvolvimento de projetos usado, chamado de </a:t>
+            </a:r>
+            <a:r>
+              <a:rPr lang="pt-BR" sz="2800" b="0" i="0" dirty="0" err="1">
+                <a:solidFill>
+                  <a:srgbClr val="3D464D"/>
+                </a:solidFill>
+                <a:effectLst/>
+                <a:latin typeface="+mn-lt"/>
+              </a:rPr>
+              <a:t>Waterfall</a:t>
+            </a:r>
+            <a:r>
+              <a:rPr lang="pt-BR" sz="2800" b="0" i="0" dirty="0">
+                <a:solidFill>
+                  <a:srgbClr val="3D464D"/>
+                </a:solidFill>
+                <a:effectLst/>
+                <a:latin typeface="+mn-lt"/>
+              </a:rPr>
+              <a:t>, foi herdado de outras engenharias, nas quais cada projeto era dividido em fases que dependiam da fase anterior ser aprovada, tendo um conjunto de requisitos. As fases só avançam, e isso tornava seus clientes satisfeitos.</a:t>
+            </a:r>
+          </a:p>
+          <a:p>
+            <a:pPr algn="l"/>
+            <a:r>
+              <a:rPr lang="pt-BR" sz="2800" b="0" i="0" dirty="0">
+                <a:solidFill>
+                  <a:srgbClr val="3D464D"/>
+                </a:solidFill>
+                <a:effectLst/>
+                <a:latin typeface="+mn-lt"/>
+              </a:rPr>
+              <a:t>Um exemplo que aplica o método </a:t>
+            </a:r>
+            <a:r>
+              <a:rPr lang="pt-BR" sz="2800" b="0" i="0" dirty="0" err="1">
+                <a:solidFill>
+                  <a:srgbClr val="3D464D"/>
+                </a:solidFill>
+                <a:effectLst/>
+                <a:latin typeface="+mn-lt"/>
+              </a:rPr>
+              <a:t>Waterfall</a:t>
+            </a:r>
+            <a:r>
+              <a:rPr lang="pt-BR" sz="2800" b="0" i="0" dirty="0">
+                <a:solidFill>
+                  <a:srgbClr val="3D464D"/>
+                </a:solidFill>
+                <a:effectLst/>
+                <a:latin typeface="+mn-lt"/>
+              </a:rPr>
+              <a:t> na engenharia civil é o de construção de imóveis: o processo de construção de um imóvel é dividido em fases, como análise do terreno, fundação e pilares de sustentação. Uma vez que uma fase é aprovada e finalizada ela não pode ser alterada.</a:t>
+            </a:r>
+          </a:p>
+          <a:p>
+            <a:pPr algn="l"/>
+            <a:r>
+              <a:rPr lang="pt-BR" sz="2800" b="0" i="0" dirty="0">
+                <a:solidFill>
+                  <a:srgbClr val="3D464D"/>
+                </a:solidFill>
+                <a:effectLst/>
+                <a:latin typeface="+mn-lt"/>
+              </a:rPr>
+              <a:t>Porém, para o desenvolvimento de software, esse método herdado de engenharias não era o ideal, porque a cada tarefa concluída eram validadas novas mudanças a partir de feedbacks, o que fazia com que o fluxo fosse alterado. Para a engenharia de software o método </a:t>
+            </a:r>
+            <a:r>
+              <a:rPr lang="pt-BR" sz="2800" b="0" i="0" dirty="0" err="1">
+                <a:solidFill>
+                  <a:srgbClr val="3D464D"/>
+                </a:solidFill>
+                <a:effectLst/>
+                <a:latin typeface="+mn-lt"/>
+              </a:rPr>
+              <a:t>Waterfall</a:t>
+            </a:r>
+            <a:r>
+              <a:rPr lang="pt-BR" sz="2800" b="0" i="0" dirty="0">
+                <a:solidFill>
+                  <a:srgbClr val="3D464D"/>
+                </a:solidFill>
+                <a:effectLst/>
+                <a:latin typeface="+mn-lt"/>
+              </a:rPr>
+              <a:t> já não dava conta das mudanças que ocorriam no meio do caminho. Então ele teve que passar por uma reestruturação para que, depois dos feedbacks de cada tarefa desenvolvida, o fluxo pudesse ser alterado durante o processo de desenvolvimento do projeto.</a:t>
+            </a:r>
+          </a:p>
+          <a:p>
+            <a:pPr algn="l"/>
+            <a:r>
+              <a:rPr lang="pt-BR" sz="2800" b="0" i="0" dirty="0">
+                <a:solidFill>
+                  <a:srgbClr val="3D464D"/>
+                </a:solidFill>
+                <a:effectLst/>
+                <a:latin typeface="+mn-lt"/>
+              </a:rPr>
+              <a:t>Ah...para você que realmente ficou curioso(a) sobre a origem do café, recomendamos a leitura da História do Café contida no link a seguir da Associação Brasileira da Indústria do Café como estudo complementar -&gt; </a:t>
+            </a:r>
+            <a:r>
+              <a:rPr lang="pt-BR" sz="2800" b="0" i="0" dirty="0">
+                <a:solidFill>
+                  <a:srgbClr val="3D464D"/>
+                </a:solidFill>
+                <a:effectLst/>
+                <a:latin typeface="+mn-lt"/>
+                <a:hlinkClick r:id="rId2"/>
+              </a:rPr>
+              <a:t>https://www.graogourmet.com/blog/historia-do-cafe/</a:t>
+            </a:r>
+            <a:endParaRPr lang="pt-BR" sz="2800" b="0" i="0" dirty="0">
+              <a:solidFill>
+                <a:srgbClr val="3D464D"/>
+              </a:solidFill>
+              <a:effectLst/>
+              <a:latin typeface="+mn-lt"/>
+            </a:endParaRPr>
+          </a:p>
+          <a:p>
+            <a:pPr algn="l"/>
+            <a:endParaRPr lang="pt-BR" sz="2800" b="0" i="0" dirty="0">
+              <a:solidFill>
+                <a:srgbClr val="3D464D"/>
+              </a:solidFill>
+              <a:effectLst/>
+              <a:latin typeface="+mn-lt"/>
+            </a:endParaRPr>
+          </a:p>
+          <a:p>
+            <a:endParaRPr lang="pt-BR" dirty="0"/>
           </a:p>
         </p:txBody>
       </p:sp>
@@ -17097,6 +17704,408 @@
     <p:extLst>
       <p:ext uri="{BB962C8B-B14F-4D97-AF65-F5344CB8AC3E}">
         <p14:creationId xmlns:p14="http://schemas.microsoft.com/office/powerpoint/2010/main" val="1078953622"/>
+      </p:ext>
+    </p:extLst>
+  </p:cSld>
+  <p:clrMapOvr>
+    <a:masterClrMapping/>
+  </p:clrMapOvr>
+</p:sld>
+</file>
+
+<file path=ppt/slides/slide17.xml><?xml version="1.0" encoding="utf-8"?>
+<p:sld xmlns:a="http://schemas.openxmlformats.org/drawingml/2006/main" xmlns:r="http://schemas.openxmlformats.org/officeDocument/2006/relationships" xmlns:p="http://schemas.openxmlformats.org/presentationml/2006/main">
+  <p:cSld>
+    <p:spTree>
+      <p:nvGrpSpPr>
+        <p:cNvPr id="1" name=""/>
+        <p:cNvGrpSpPr/>
+        <p:nvPr/>
+      </p:nvGrpSpPr>
+      <p:grpSpPr>
+        <a:xfrm>
+          <a:off x="0" y="0"/>
+          <a:ext cx="0" cy="0"/>
+          <a:chOff x="0" y="0"/>
+          <a:chExt cx="0" cy="0"/>
+        </a:xfrm>
+      </p:grpSpPr>
+      <p:sp>
+        <p:nvSpPr>
+          <p:cNvPr id="3" name="Subtítulo 2"/>
+          <p:cNvSpPr>
+            <a:spLocks noGrp="1"/>
+          </p:cNvSpPr>
+          <p:nvPr>
+            <p:ph type="subTitle" idx="4294967295"/>
+          </p:nvPr>
+        </p:nvSpPr>
+        <p:spPr>
+          <a:xfrm>
+            <a:off x="855619" y="2469279"/>
+            <a:ext cx="10077423" cy="1137793"/>
+          </a:xfrm>
+        </p:spPr>
+        <p:txBody>
+          <a:bodyPr rtlCol="0">
+            <a:normAutofit/>
+          </a:bodyPr>
+          <a:lstStyle/>
+          <a:p>
+            <a:pPr marL="0" indent="0" algn="ctr" rtl="0">
+              <a:buNone/>
+            </a:pPr>
+            <a:r>
+              <a:rPr lang="pt-BR" sz="2300" b="1" dirty="0">
+                <a:solidFill>
+                  <a:schemeClr val="bg1"/>
+                </a:solidFill>
+                <a:latin typeface="+mj-lt"/>
+              </a:rPr>
+              <a:t>02. O Método </a:t>
+            </a:r>
+            <a:r>
+              <a:rPr lang="pt-BR" sz="2300" b="1" dirty="0" err="1">
+                <a:solidFill>
+                  <a:schemeClr val="bg1"/>
+                </a:solidFill>
+                <a:latin typeface="+mj-lt"/>
+              </a:rPr>
+              <a:t>Waterfall</a:t>
+            </a:r>
+            <a:endParaRPr lang="pt-BR" sz="2300" b="1" dirty="0">
+              <a:solidFill>
+                <a:schemeClr val="bg1"/>
+              </a:solidFill>
+              <a:latin typeface="+mj-lt"/>
+            </a:endParaRPr>
+          </a:p>
+        </p:txBody>
+      </p:sp>
+    </p:spTree>
+    <p:extLst>
+      <p:ext uri="{BB962C8B-B14F-4D97-AF65-F5344CB8AC3E}">
+        <p14:creationId xmlns:p14="http://schemas.microsoft.com/office/powerpoint/2010/main" val="3809598995"/>
+      </p:ext>
+    </p:extLst>
+  </p:cSld>
+  <p:clrMapOvr>
+    <a:masterClrMapping/>
+  </p:clrMapOvr>
+</p:sld>
+</file>
+
+<file path=ppt/slides/slide18.xml><?xml version="1.0" encoding="utf-8"?>
+<p:sld xmlns:a="http://schemas.openxmlformats.org/drawingml/2006/main" xmlns:r="http://schemas.openxmlformats.org/officeDocument/2006/relationships" xmlns:p="http://schemas.openxmlformats.org/presentationml/2006/main">
+  <p:cSld>
+    <p:spTree>
+      <p:nvGrpSpPr>
+        <p:cNvPr id="1" name=""/>
+        <p:cNvGrpSpPr/>
+        <p:nvPr/>
+      </p:nvGrpSpPr>
+      <p:grpSpPr>
+        <a:xfrm>
+          <a:off x="0" y="0"/>
+          <a:ext cx="0" cy="0"/>
+          <a:chOff x="0" y="0"/>
+          <a:chExt cx="0" cy="0"/>
+        </a:xfrm>
+      </p:grpSpPr>
+      <p:sp>
+        <p:nvSpPr>
+          <p:cNvPr id="2" name="Título 1">
+            <a:extLst>
+              <a:ext uri="{FF2B5EF4-FFF2-40B4-BE49-F238E27FC236}">
+                <a16:creationId xmlns:a16="http://schemas.microsoft.com/office/drawing/2014/main" id="{58105817-5191-55B8-F3B0-E088D6BFD6A2}"/>
+              </a:ext>
+            </a:extLst>
+          </p:cNvPr>
+          <p:cNvSpPr>
+            <a:spLocks noGrp="1"/>
+          </p:cNvSpPr>
+          <p:nvPr>
+            <p:ph type="title"/>
+          </p:nvPr>
+        </p:nvSpPr>
+        <p:spPr/>
+        <p:txBody>
+          <a:bodyPr/>
+          <a:lstStyle/>
+          <a:p>
+            <a:r>
+              <a:rPr lang="pt-BR" dirty="0"/>
+              <a:t>Método </a:t>
+            </a:r>
+            <a:r>
+              <a:rPr lang="pt-BR" dirty="0" err="1"/>
+              <a:t>Waterfall</a:t>
+            </a:r>
+            <a:endParaRPr lang="pt-BR" dirty="0"/>
+          </a:p>
+        </p:txBody>
+      </p:sp>
+      <p:sp>
+        <p:nvSpPr>
+          <p:cNvPr id="3" name="Espaço Reservado para Conteúdo 2">
+            <a:extLst>
+              <a:ext uri="{FF2B5EF4-FFF2-40B4-BE49-F238E27FC236}">
+                <a16:creationId xmlns:a16="http://schemas.microsoft.com/office/drawing/2014/main" id="{7B29A085-9412-8352-C5D8-D0DFB1051E59}"/>
+              </a:ext>
+            </a:extLst>
+          </p:cNvPr>
+          <p:cNvSpPr>
+            <a:spLocks noGrp="1"/>
+          </p:cNvSpPr>
+          <p:nvPr>
+            <p:ph sz="quarter" idx="10"/>
+          </p:nvPr>
+        </p:nvSpPr>
+        <p:spPr/>
+        <p:txBody>
+          <a:bodyPr/>
+          <a:lstStyle/>
+          <a:p>
+            <a:r>
+              <a:rPr lang="pt-BR" b="1" dirty="0" err="1"/>
+              <a:t>Waterfall</a:t>
+            </a:r>
+            <a:r>
+              <a:rPr lang="pt-BR" b="1" dirty="0"/>
+              <a:t> </a:t>
+            </a:r>
+          </a:p>
+          <a:p>
+            <a:r>
+              <a:rPr lang="pt-BR" dirty="0"/>
+              <a:t>Requisitos: </a:t>
+            </a:r>
+          </a:p>
+          <a:p>
+            <a:pPr marL="228600" indent="-228600">
+              <a:buAutoNum type="arabicParenR"/>
+            </a:pPr>
+            <a:r>
+              <a:rPr lang="pt-BR" dirty="0"/>
+              <a:t>Não mudamos o tamanho do lote </a:t>
+            </a:r>
+          </a:p>
+          <a:p>
+            <a:pPr marL="228600" indent="-228600">
+              <a:buAutoNum type="arabicParenR"/>
+            </a:pPr>
+            <a:r>
+              <a:rPr lang="pt-BR" dirty="0"/>
+              <a:t>Priorização por etapas</a:t>
+            </a:r>
+          </a:p>
+          <a:p>
+            <a:pPr marL="228600" indent="-228600">
+              <a:buAutoNum type="arabicParenR"/>
+            </a:pPr>
+            <a:r>
+              <a:rPr lang="pt-BR" dirty="0"/>
+              <a:t>Feedback tardio</a:t>
+            </a:r>
+          </a:p>
+        </p:txBody>
+      </p:sp>
+    </p:spTree>
+    <p:extLst>
+      <p:ext uri="{BB962C8B-B14F-4D97-AF65-F5344CB8AC3E}">
+        <p14:creationId xmlns:p14="http://schemas.microsoft.com/office/powerpoint/2010/main" val="3298694238"/>
+      </p:ext>
+    </p:extLst>
+  </p:cSld>
+  <p:clrMapOvr>
+    <a:masterClrMapping/>
+  </p:clrMapOvr>
+</p:sld>
+</file>
+
+<file path=ppt/slides/slide19.xml><?xml version="1.0" encoding="utf-8"?>
+<p:sld xmlns:a="http://schemas.openxmlformats.org/drawingml/2006/main" xmlns:r="http://schemas.openxmlformats.org/officeDocument/2006/relationships" xmlns:p="http://schemas.openxmlformats.org/presentationml/2006/main">
+  <p:cSld>
+    <p:spTree>
+      <p:nvGrpSpPr>
+        <p:cNvPr id="1" name=""/>
+        <p:cNvGrpSpPr/>
+        <p:nvPr/>
+      </p:nvGrpSpPr>
+      <p:grpSpPr>
+        <a:xfrm>
+          <a:off x="0" y="0"/>
+          <a:ext cx="0" cy="0"/>
+          <a:chOff x="0" y="0"/>
+          <a:chExt cx="0" cy="0"/>
+        </a:xfrm>
+      </p:grpSpPr>
+      <p:sp>
+        <p:nvSpPr>
+          <p:cNvPr id="2" name="Título 1">
+            <a:extLst>
+              <a:ext uri="{FF2B5EF4-FFF2-40B4-BE49-F238E27FC236}">
+                <a16:creationId xmlns:a16="http://schemas.microsoft.com/office/drawing/2014/main" id="{AF4B0C40-3058-0F90-8E45-9F1D5E6CA47E}"/>
+              </a:ext>
+            </a:extLst>
+          </p:cNvPr>
+          <p:cNvSpPr>
+            <a:spLocks noGrp="1"/>
+          </p:cNvSpPr>
+          <p:nvPr>
+            <p:ph type="title"/>
+          </p:nvPr>
+        </p:nvSpPr>
+        <p:spPr/>
+        <p:txBody>
+          <a:bodyPr/>
+          <a:lstStyle/>
+          <a:p>
+            <a:r>
+              <a:rPr lang="pt-BR" dirty="0"/>
+              <a:t>O que aprendemos? </a:t>
+            </a:r>
+          </a:p>
+        </p:txBody>
+      </p:sp>
+      <p:sp>
+        <p:nvSpPr>
+          <p:cNvPr id="3" name="Espaço Reservado para Conteúdo 2">
+            <a:extLst>
+              <a:ext uri="{FF2B5EF4-FFF2-40B4-BE49-F238E27FC236}">
+                <a16:creationId xmlns:a16="http://schemas.microsoft.com/office/drawing/2014/main" id="{FCFFF6FF-ED6B-3C05-2307-B08979CB2609}"/>
+              </a:ext>
+            </a:extLst>
+          </p:cNvPr>
+          <p:cNvSpPr>
+            <a:spLocks noGrp="1"/>
+          </p:cNvSpPr>
+          <p:nvPr>
+            <p:ph sz="quarter" idx="13"/>
+          </p:nvPr>
+        </p:nvSpPr>
+        <p:spPr>
+          <a:xfrm>
+            <a:off x="397565" y="2571784"/>
+            <a:ext cx="11396870" cy="3789260"/>
+          </a:xfrm>
+        </p:spPr>
+        <p:txBody>
+          <a:bodyPr>
+            <a:normAutofit fontScale="70000" lnSpcReduction="20000"/>
+          </a:bodyPr>
+          <a:lstStyle/>
+          <a:p>
+            <a:pPr algn="l"/>
+            <a:r>
+              <a:rPr lang="pt-BR" sz="2000" b="0" i="0" dirty="0">
+                <a:solidFill>
+                  <a:srgbClr val="3D464D"/>
+                </a:solidFill>
+                <a:effectLst/>
+                <a:latin typeface="Source Serif Pro" panose="02040603050405020204" pitchFamily="18" charset="0"/>
+              </a:rPr>
+              <a:t>Para utilizar o Método </a:t>
+            </a:r>
+            <a:r>
+              <a:rPr lang="pt-BR" sz="2000" b="0" i="0" dirty="0" err="1">
+                <a:solidFill>
+                  <a:srgbClr val="3D464D"/>
+                </a:solidFill>
+                <a:effectLst/>
+                <a:latin typeface="Source Serif Pro" panose="02040603050405020204" pitchFamily="18" charset="0"/>
+              </a:rPr>
+              <a:t>Waterfall</a:t>
+            </a:r>
+            <a:r>
+              <a:rPr lang="pt-BR" sz="2000" b="0" i="0" dirty="0">
+                <a:solidFill>
+                  <a:srgbClr val="3D464D"/>
+                </a:solidFill>
+                <a:effectLst/>
+                <a:latin typeface="Source Serif Pro" panose="02040603050405020204" pitchFamily="18" charset="0"/>
+              </a:rPr>
+              <a:t> em um desenvolvimento de Software é necessário que os requisitos/documentação sejam aprovados e assinados pelo cliente e responsável do projeto.</a:t>
+            </a:r>
+          </a:p>
+          <a:p>
+            <a:pPr algn="l"/>
+            <a:r>
+              <a:rPr lang="pt-BR" sz="2000" b="0" i="0" dirty="0">
+                <a:solidFill>
+                  <a:srgbClr val="3D464D"/>
+                </a:solidFill>
+                <a:effectLst/>
+                <a:latin typeface="Source Serif Pro" panose="02040603050405020204" pitchFamily="18" charset="0"/>
+              </a:rPr>
+              <a:t>Esse requisito tem todo o detalhamento do fluxo que deve ser seguido para atingir o seu objetivo final e, uma vez assinado, esse fluxo não muda mais.</a:t>
+            </a:r>
+          </a:p>
+          <a:p>
+            <a:pPr algn="l"/>
+            <a:r>
+              <a:rPr lang="pt-BR" sz="2000" b="0" i="0" dirty="0">
+                <a:solidFill>
+                  <a:srgbClr val="3D464D"/>
+                </a:solidFill>
+                <a:effectLst/>
+                <a:latin typeface="Source Serif Pro" panose="02040603050405020204" pitchFamily="18" charset="0"/>
+              </a:rPr>
+              <a:t>No </a:t>
+            </a:r>
+            <a:r>
+              <a:rPr lang="pt-BR" sz="2000" b="0" i="0" dirty="0" err="1">
+                <a:solidFill>
+                  <a:srgbClr val="3D464D"/>
+                </a:solidFill>
+                <a:effectLst/>
+                <a:latin typeface="Source Serif Pro" panose="02040603050405020204" pitchFamily="18" charset="0"/>
+              </a:rPr>
+              <a:t>Waterfall</a:t>
+            </a:r>
+            <a:r>
+              <a:rPr lang="pt-BR" sz="2000" b="0" i="0" dirty="0">
+                <a:solidFill>
+                  <a:srgbClr val="3D464D"/>
+                </a:solidFill>
+                <a:effectLst/>
+                <a:latin typeface="Source Serif Pro" panose="02040603050405020204" pitchFamily="18" charset="0"/>
+              </a:rPr>
+              <a:t>, quando dividimos o modelo em etapas, a primeira etapa se direciona para a segunda e esta se movimenta para a terceira e assim por diante. Com isso, o impacto de um melhor feedback do projeto diminui, porque além do resultado ser visto só no final do processo, as fases não podem ser retrocedidas, excluindo a possibilidade de alguma alteração.</a:t>
+            </a:r>
+          </a:p>
+          <a:p>
+            <a:pPr algn="l"/>
+            <a:r>
+              <a:rPr lang="pt-BR" sz="2000" b="0" i="0" dirty="0">
+                <a:solidFill>
+                  <a:srgbClr val="3D464D"/>
+                </a:solidFill>
+                <a:effectLst/>
+                <a:latin typeface="Source Serif Pro" panose="02040603050405020204" pitchFamily="18" charset="0"/>
+              </a:rPr>
+              <a:t>Outro problema que podemos observar é que um projeto definido hoje pode não ter o mesmo sentido daqui 6 meses, porque há muita volatilidade no mundo, as coisas evoluem rapidamente, principalmente a tecnologia.</a:t>
+            </a:r>
+          </a:p>
+          <a:p>
+            <a:pPr algn="l"/>
+            <a:endParaRPr lang="pt-BR" sz="2800" b="0" i="0" dirty="0">
+              <a:solidFill>
+                <a:srgbClr val="3D464D"/>
+              </a:solidFill>
+              <a:effectLst/>
+              <a:latin typeface="+mn-lt"/>
+            </a:endParaRPr>
+          </a:p>
+          <a:p>
+            <a:endParaRPr lang="pt-BR" dirty="0"/>
+          </a:p>
+        </p:txBody>
+      </p:sp>
+    </p:spTree>
+    <p:extLst>
+      <p:ext uri="{BB962C8B-B14F-4D97-AF65-F5344CB8AC3E}">
+        <p14:creationId xmlns:p14="http://schemas.microsoft.com/office/powerpoint/2010/main" val="2642297977"/>
       </p:ext>
     </p:extLst>
   </p:cSld>

</xml_diff>